<commit_message>
Se termino con los detalles del analisis
</commit_message>
<xml_diff>
--- a/parcial 1.pptx
+++ b/parcial 1.pptx
@@ -21839,16 +21839,12 @@
               <a:buNone/>
             </a:pPr>
             <a:r>
-              <a:rPr lang="en"/>
-              <a:t>Computer </a:t>
-            </a:r>
-            <a:r>
-              <a:rPr lang="en">
+              <a:rPr lang="es-CO" dirty="0">
                 <a:solidFill>
                   <a:schemeClr val="accent4"/>
                 </a:solidFill>
               </a:rPr>
-              <a:t>mockup</a:t>
+              <a:t>Estructura del Horario:</a:t>
             </a:r>
             <a:endParaRPr dirty="0">
               <a:solidFill>
@@ -21870,8 +21866,8 @@
         </p:nvSpPr>
         <p:spPr>
           <a:xfrm>
-            <a:off x="713225" y="2466050"/>
-            <a:ext cx="3249000" cy="1400100"/>
+            <a:off x="324832" y="2466050"/>
+            <a:ext cx="3637393" cy="1400100"/>
           </a:xfrm>
           <a:prstGeom prst="rect">
             <a:avLst/>
@@ -21883,7 +21879,7 @@
           </a:bodyPr>
           <a:lstStyle/>
           <a:p>
-            <a:pPr marL="0" lvl="0" indent="0" algn="l" rtl="0">
+            <a:pPr marL="0" lvl="0" indent="0" algn="just" rtl="0">
               <a:spcBef>
                 <a:spcPts val="0"/>
               </a:spcBef>
@@ -21893,8 +21889,8 @@
               <a:buNone/>
             </a:pPr>
             <a:r>
-              <a:rPr lang="en"/>
-              <a:t>You can replace the image on the screen with your own work. Just right-click on it and select “Replace image”</a:t>
+              <a:rPr lang="es-CO" dirty="0"/>
+              <a:t>Este será el prototipo que esperamos incorporar, ya sea en consola, o al final en un [archivo.txt], esperamos poder incorporarlo en ambos métodos.</a:t>
             </a:r>
             <a:endParaRPr dirty="0"/>
           </a:p>
@@ -22766,6 +22762,35 @@
           </p:txBody>
         </p:sp>
       </p:grpSp>
+      <p:pic>
+        <p:nvPicPr>
+          <p:cNvPr id="3" name="Imagen 2">
+            <a:extLst>
+              <a:ext uri="{FF2B5EF4-FFF2-40B4-BE49-F238E27FC236}">
+                <a16:creationId xmlns:a16="http://schemas.microsoft.com/office/drawing/2014/main" id="{BDBDE37D-2934-825D-FCEF-41BA28C9EA94}"/>
+              </a:ext>
+            </a:extLst>
+          </p:cNvPr>
+          <p:cNvPicPr>
+            <a:picLocks noChangeAspect="1"/>
+          </p:cNvPicPr>
+          <p:nvPr/>
+        </p:nvPicPr>
+        <p:blipFill rotWithShape="1">
+          <a:blip r:embed="rId3"/>
+          <a:srcRect r="2654"/>
+          <a:stretch/>
+        </p:blipFill>
+        <p:spPr>
+          <a:xfrm>
+            <a:off x="4405567" y="555438"/>
+            <a:ext cx="4413601" cy="3997579"/>
+          </a:xfrm>
+          <a:prstGeom prst="rect">
+            <a:avLst/>
+          </a:prstGeom>
+        </p:spPr>
+      </p:pic>
     </p:spTree>
   </p:cSld>
   <p:clrMapOvr>
@@ -22799,11 +22824,14 @@
         </p:nvGrpSpPr>
         <p:grpSpPr>
           <a:xfrm>
-            <a:off x="1225151" y="735610"/>
-            <a:ext cx="2697276" cy="3672287"/>
+            <a:off x="521494" y="735610"/>
+            <a:ext cx="3714750" cy="3672287"/>
             <a:chOff x="1655550" y="790900"/>
             <a:chExt cx="2510262" cy="3417671"/>
           </a:xfrm>
+          <a:solidFill>
+            <a:schemeClr val="tx1"/>
+          </a:solidFill>
         </p:grpSpPr>
         <p:sp>
           <p:nvSpPr>
@@ -22860,11 +22888,11 @@
                 </a:path>
               </a:pathLst>
             </a:custGeom>
-            <a:solidFill>
-              <a:schemeClr val="accent2"/>
-            </a:solidFill>
-            <a:ln>
-              <a:noFill/>
+            <a:grpFill/>
+            <a:ln>
+              <a:solidFill>
+                <a:schemeClr val="bg1"/>
+              </a:solidFill>
             </a:ln>
           </p:spPr>
           <p:txBody>
@@ -22930,11 +22958,11 @@
                 </a:path>
               </a:pathLst>
             </a:custGeom>
-            <a:solidFill>
-              <a:schemeClr val="accent2"/>
-            </a:solidFill>
-            <a:ln>
-              <a:noFill/>
+            <a:grpFill/>
+            <a:ln>
+              <a:solidFill>
+                <a:schemeClr val="bg1"/>
+              </a:solidFill>
             </a:ln>
           </p:spPr>
           <p:txBody>
@@ -22992,16 +23020,16 @@
               <a:buNone/>
             </a:pPr>
             <a:r>
-              <a:rPr lang="en"/>
-              <a:t>Tablet </a:t>
+              <a:rPr lang="en" dirty="0"/>
+              <a:t>Inicio del  </a:t>
             </a:r>
             <a:r>
-              <a:rPr lang="en">
+              <a:rPr lang="en" dirty="0">
                 <a:solidFill>
                   <a:schemeClr val="accent4"/>
                 </a:solidFill>
               </a:rPr>
-              <a:t>mockup</a:t>
+              <a:t>Codigo:</a:t>
             </a:r>
             <a:endParaRPr dirty="0">
               <a:solidFill>
@@ -23047,7 +23075,7 @@
             </a:pPr>
             <a:r>
               <a:rPr lang="en" dirty="0"/>
-              <a:t>You can replace the image on the screen with your own work. Just right-click on it and select “Replace image”</a:t>
+              <a:t>Planteamiento inicial de como esperemos crear la estructura para resolver los problemas.</a:t>
             </a:r>
             <a:endParaRPr dirty="0"/>
           </a:p>
@@ -23301,6 +23329,77 @@
               <a:cs typeface="Comfortaa"/>
               <a:sym typeface="Comfortaa"/>
             </a:endParaRPr>
+          </a:p>
+        </p:txBody>
+      </p:sp>
+      <p:sp>
+        <p:nvSpPr>
+          <p:cNvPr id="3" name="CuadroTexto 2">
+            <a:extLst>
+              <a:ext uri="{FF2B5EF4-FFF2-40B4-BE49-F238E27FC236}">
+                <a16:creationId xmlns:a16="http://schemas.microsoft.com/office/drawing/2014/main" id="{603D2C37-8913-A39F-F5AE-87DB436D802F}"/>
+              </a:ext>
+            </a:extLst>
+          </p:cNvPr>
+          <p:cNvSpPr txBox="1"/>
+          <p:nvPr/>
+        </p:nvSpPr>
+        <p:spPr>
+          <a:xfrm>
+            <a:off x="714932" y="988408"/>
+            <a:ext cx="3419417" cy="2893100"/>
+          </a:xfrm>
+          <a:prstGeom prst="rect">
+            <a:avLst/>
+          </a:prstGeom>
+          <a:noFill/>
+        </p:spPr>
+        <p:txBody>
+          <a:bodyPr wrap="square" rtlCol="0">
+            <a:spAutoFit/>
+          </a:bodyPr>
+          <a:lstStyle/>
+          <a:p>
+            <a:r>
+              <a:rPr lang="es-CO" dirty="0"/>
+              <a:t>Incorporación:</a:t>
+            </a:r>
+          </a:p>
+          <a:p>
+            <a:endParaRPr lang="es-CO" dirty="0"/>
+          </a:p>
+          <a:p>
+            <a:r>
+              <a:rPr lang="es-CO" dirty="0"/>
+              <a:t>Intentaremos crear un matriz, que guarde los valores  de intervalos de tiempo en horas, y agregar un  símbolo si esa hora esta disponible o no, para ir agregándola al horario:</a:t>
+            </a:r>
+          </a:p>
+          <a:p>
+            <a:endParaRPr lang="es-CO" dirty="0"/>
+          </a:p>
+          <a:p>
+            <a:r>
+              <a:rPr lang="es-CO" dirty="0"/>
+              <a:t>Ejemplo:</a:t>
+            </a:r>
+          </a:p>
+          <a:p>
+            <a:endParaRPr lang="es-CO" dirty="0"/>
+          </a:p>
+          <a:p>
+            <a:r>
+              <a:rPr lang="es-CO" dirty="0"/>
+              <a:t>[Hora 8am-9am]=[O]  Disponible</a:t>
+            </a:r>
+          </a:p>
+          <a:p>
+            <a:endParaRPr lang="es-CO" dirty="0"/>
+          </a:p>
+          <a:p>
+            <a:r>
+              <a:rPr lang="es-CO" dirty="0"/>
+              <a:t>[Hora 8am-9am]=[X]  No Disponible</a:t>
+            </a:r>
           </a:p>
         </p:txBody>
       </p:sp>
@@ -23381,8 +23480,8 @@
         </p:nvSpPr>
         <p:spPr>
           <a:xfrm>
-            <a:off x="713225" y="1402850"/>
-            <a:ext cx="3249000" cy="1063200"/>
+            <a:off x="511109" y="273819"/>
+            <a:ext cx="3965931" cy="1188700"/>
           </a:xfrm>
           <a:prstGeom prst="rect">
             <a:avLst/>
@@ -23405,7 +23504,7 @@
             </a:pPr>
             <a:r>
               <a:rPr lang="en" dirty="0"/>
-              <a:t>Phone </a:t>
+              <a:t>Formato de </a:t>
             </a:r>
             <a:r>
               <a:rPr lang="en" dirty="0">
@@ -23413,7 +23512,7 @@
                   <a:schemeClr val="accent4"/>
                 </a:solidFill>
               </a:rPr>
-              <a:t>mockup</a:t>
+              <a:t>entrada:</a:t>
             </a:r>
             <a:endParaRPr dirty="0">
               <a:solidFill>
@@ -23435,8 +23534,8 @@
         </p:nvSpPr>
         <p:spPr>
           <a:xfrm>
-            <a:off x="713225" y="2466050"/>
-            <a:ext cx="3249000" cy="1400100"/>
+            <a:off x="77397" y="1394046"/>
+            <a:ext cx="4217477" cy="2503727"/>
           </a:xfrm>
           <a:prstGeom prst="rect">
             <a:avLst/>
@@ -23448,7 +23547,7 @@
           </a:bodyPr>
           <a:lstStyle/>
           <a:p>
-            <a:pPr marL="0" lvl="0" indent="0" algn="l" rtl="0">
+            <a:pPr marL="0" lvl="0" indent="0" algn="just" rtl="0">
               <a:spcBef>
                 <a:spcPts val="0"/>
               </a:spcBef>
@@ -23458,9 +23557,99 @@
               <a:buNone/>
             </a:pPr>
             <a:r>
-              <a:rPr lang="en" dirty="0"/>
-              <a:t>You can replace the image on the screen with your own work. Just right-click on it and select “Replace image”</a:t>
+              <a:rPr lang="es-CO" dirty="0"/>
+              <a:t>Planeamos crear una única matriz con los mismos intervalos de tiempo, para ir ingresando los horarios, y el usuario </a:t>
             </a:r>
+            <a:r>
+              <a:rPr lang="es-CO" dirty="0" err="1"/>
+              <a:t>recivira</a:t>
+            </a:r>
+            <a:r>
+              <a:rPr lang="es-CO" dirty="0"/>
+              <a:t> lo mismo día a día, cambiando únicamente el nombre del día[ {Lunes, Martes…}. </a:t>
+            </a:r>
+          </a:p>
+          <a:p>
+            <a:pPr marL="0" lvl="0" indent="0" algn="just" rtl="0">
+              <a:spcBef>
+                <a:spcPts val="0"/>
+              </a:spcBef>
+              <a:spcAft>
+                <a:spcPts val="0"/>
+              </a:spcAft>
+              <a:buNone/>
+            </a:pPr>
+            <a:endParaRPr lang="es-CO" dirty="0"/>
+          </a:p>
+          <a:p>
+            <a:pPr marL="0" lvl="0" indent="0" algn="just" rtl="0">
+              <a:spcBef>
+                <a:spcPts val="0"/>
+              </a:spcBef>
+              <a:spcAft>
+                <a:spcPts val="0"/>
+              </a:spcAft>
+              <a:buNone/>
+            </a:pPr>
+            <a:r>
+              <a:rPr lang="es-CO" dirty="0"/>
+              <a:t>Limitaremos el numero de créditos:</a:t>
+            </a:r>
+          </a:p>
+          <a:p>
+            <a:pPr marL="285750" lvl="0" indent="-285750" algn="just" rtl="0">
+              <a:spcBef>
+                <a:spcPts val="0"/>
+              </a:spcBef>
+              <a:spcAft>
+                <a:spcPts val="0"/>
+              </a:spcAft>
+              <a:buFont typeface="Arial" panose="020B0604020202020204" pitchFamily="34" charset="0"/>
+              <a:buChar char="•"/>
+            </a:pPr>
+            <a:r>
+              <a:rPr lang="es-CO" dirty="0"/>
+              <a:t>Máximo 24 Créditos.</a:t>
+            </a:r>
+          </a:p>
+          <a:p>
+            <a:pPr marL="285750" lvl="0" indent="-285750" algn="just" rtl="0">
+              <a:spcBef>
+                <a:spcPts val="0"/>
+              </a:spcBef>
+              <a:spcAft>
+                <a:spcPts val="0"/>
+              </a:spcAft>
+              <a:buFont typeface="Arial" panose="020B0604020202020204" pitchFamily="34" charset="0"/>
+              <a:buChar char="•"/>
+            </a:pPr>
+            <a:r>
+              <a:rPr lang="es-CO" dirty="0"/>
+              <a:t>Mínimo 8 Créditos.</a:t>
+            </a:r>
+          </a:p>
+          <a:p>
+            <a:pPr marL="0" lvl="0" indent="0" algn="just" rtl="0">
+              <a:spcBef>
+                <a:spcPts val="0"/>
+              </a:spcBef>
+              <a:spcAft>
+                <a:spcPts val="0"/>
+              </a:spcAft>
+              <a:buNone/>
+            </a:pPr>
+            <a:endParaRPr lang="es-CO" dirty="0"/>
+          </a:p>
+          <a:p>
+            <a:pPr marL="0" lvl="0" indent="0" algn="just" rtl="0">
+              <a:spcBef>
+                <a:spcPts val="0"/>
+              </a:spcBef>
+              <a:spcAft>
+                <a:spcPts val="0"/>
+              </a:spcAft>
+              <a:buNone/>
+            </a:pPr>
             <a:endParaRPr dirty="0"/>
           </a:p>
         </p:txBody>
@@ -23534,11 +23723,16 @@
         </p:nvGrpSpPr>
         <p:grpSpPr>
           <a:xfrm>
-            <a:off x="5186401" y="709411"/>
-            <a:ext cx="1834973" cy="3724678"/>
+            <a:off x="5097017" y="305621"/>
+            <a:ext cx="3140532" cy="4349094"/>
             <a:chOff x="5186401" y="494525"/>
             <a:chExt cx="1834973" cy="3724678"/>
           </a:xfrm>
+          <a:solidFill>
+            <a:schemeClr val="tx2">
+              <a:lumMod val="75000"/>
+            </a:schemeClr>
+          </a:solidFill>
         </p:grpSpPr>
         <p:sp>
           <p:nvSpPr>
@@ -23595,9 +23789,7 @@
                 </a:path>
               </a:pathLst>
             </a:custGeom>
-            <a:solidFill>
-              <a:schemeClr val="accent1"/>
-            </a:solidFill>
+            <a:grpFill/>
             <a:ln>
               <a:noFill/>
             </a:ln>
@@ -23676,9 +23868,7 @@
                 </a:path>
               </a:pathLst>
             </a:custGeom>
-            <a:solidFill>
-              <a:schemeClr val="dk1"/>
-            </a:solidFill>
+            <a:grpFill/>
             <a:ln>
               <a:noFill/>
             </a:ln>
@@ -23846,7 +24036,7 @@
         </p:nvSpPr>
         <p:spPr>
           <a:xfrm>
-            <a:off x="107250" y="1162900"/>
+            <a:off x="82640" y="248428"/>
             <a:ext cx="704700" cy="870000"/>
           </a:xfrm>
           <a:prstGeom prst="rect">
@@ -23873,7 +24063,7 @@
               <a:buNone/>
             </a:pPr>
             <a:r>
-              <a:rPr lang="en" sz="5000">
+              <a:rPr lang="en" sz="5000" dirty="0">
                 <a:solidFill>
                   <a:schemeClr val="accent1"/>
                 </a:solidFill>
@@ -23989,7 +24179,7 @@
               <a:buNone/>
             </a:pPr>
             <a:r>
-              <a:rPr lang="en" sz="5000">
+              <a:rPr lang="en" sz="5000" dirty="0">
                 <a:solidFill>
                   <a:schemeClr val="accent1"/>
                 </a:solidFill>
@@ -24016,7 +24206,7 @@
         </p:nvGrpSpPr>
         <p:grpSpPr>
           <a:xfrm>
-            <a:off x="350039" y="3944000"/>
+            <a:off x="136002" y="4068135"/>
             <a:ext cx="2536147" cy="887325"/>
             <a:chOff x="880714" y="3731738"/>
             <a:chExt cx="2536147" cy="887325"/>
@@ -24569,6 +24759,80 @@
           </p:txBody>
         </p:sp>
       </p:grpSp>
+      <p:sp>
+        <p:nvSpPr>
+          <p:cNvPr id="4" name="Rectángulo: esquinas redondeadas 3">
+            <a:extLst>
+              <a:ext uri="{FF2B5EF4-FFF2-40B4-BE49-F238E27FC236}">
+                <a16:creationId xmlns:a16="http://schemas.microsoft.com/office/drawing/2014/main" id="{FE21689C-34AC-ACAF-7E9F-AF1E13460FC5}"/>
+              </a:ext>
+            </a:extLst>
+          </p:cNvPr>
+          <p:cNvSpPr/>
+          <p:nvPr/>
+        </p:nvSpPr>
+        <p:spPr>
+          <a:xfrm>
+            <a:off x="5281912" y="488785"/>
+            <a:ext cx="2742124" cy="3984052"/>
+          </a:xfrm>
+          <a:prstGeom prst="roundRect">
+            <a:avLst/>
+          </a:prstGeom>
+        </p:spPr>
+        <p:style>
+          <a:lnRef idx="2">
+            <a:schemeClr val="accent6"/>
+          </a:lnRef>
+          <a:fillRef idx="1">
+            <a:schemeClr val="lt1"/>
+          </a:fillRef>
+          <a:effectRef idx="0">
+            <a:schemeClr val="accent6"/>
+          </a:effectRef>
+          <a:fontRef idx="minor">
+            <a:schemeClr val="dk1"/>
+          </a:fontRef>
+        </p:style>
+        <p:txBody>
+          <a:bodyPr rtlCol="0" anchor="ctr"/>
+          <a:lstStyle/>
+          <a:p>
+            <a:pPr algn="ctr"/>
+            <a:endParaRPr lang="es-CO"/>
+          </a:p>
+        </p:txBody>
+      </p:sp>
+      <p:pic>
+        <p:nvPicPr>
+          <p:cNvPr id="5" name="Imagen 4">
+            <a:extLst>
+              <a:ext uri="{FF2B5EF4-FFF2-40B4-BE49-F238E27FC236}">
+                <a16:creationId xmlns:a16="http://schemas.microsoft.com/office/drawing/2014/main" id="{57A835D1-7B32-86F9-F676-F99BC5D05188}"/>
+              </a:ext>
+            </a:extLst>
+          </p:cNvPr>
+          <p:cNvPicPr>
+            <a:picLocks noChangeAspect="1"/>
+          </p:cNvPicPr>
+          <p:nvPr/>
+        </p:nvPicPr>
+        <p:blipFill>
+          <a:blip r:embed="rId3"/>
+          <a:stretch>
+            <a:fillRect/>
+          </a:stretch>
+        </p:blipFill>
+        <p:spPr>
+          <a:xfrm>
+            <a:off x="5630245" y="512112"/>
+            <a:ext cx="1987468" cy="3907875"/>
+          </a:xfrm>
+          <a:prstGeom prst="rect">
+            <a:avLst/>
+          </a:prstGeom>
+        </p:spPr>
+      </p:pic>
     </p:spTree>
   </p:cSld>
   <p:clrMapOvr>

</xml_diff>